<commit_message>
commit lanjutan untuk tutorial
</commit_message>
<xml_diff>
--- a/Laravel/materi1/Apa itu Laravel.pptx
+++ b/Laravel/materi1/Apa itu Laravel.pptx
@@ -5165,7 +5165,7 @@
           <a:stretch/>
         </p:blipFill>
         <p:spPr bwMode="auto">
-          <a:xfrm rot="1628872" flipH="0" flipV="0">
+          <a:xfrm rot="1628871" flipH="0" flipV="0">
             <a:off x="9489057" y="1368793"/>
             <a:ext cx="3733777" cy="3733777"/>
           </a:xfrm>
@@ -5400,7 +5400,7 @@
           <a:stretch/>
         </p:blipFill>
         <p:spPr bwMode="auto">
-          <a:xfrm rot="20242174" flipH="0" flipV="0">
+          <a:xfrm rot="20242173" flipH="0" flipV="0">
             <a:off x="-2254156" y="-661549"/>
             <a:ext cx="2697138" cy="2697138"/>
           </a:xfrm>

</xml_diff>